<commit_message>
Try graph laplacian approach
</commit_message>
<xml_diff>
--- a/reports/Project Status 9.pptx
+++ b/reports/Project Status 9.pptx
@@ -5,12 +5,18 @@
     <p:sldMasterId id="2147483648" r:id="rId1"/>
   </p:sldMasterIdLst>
   <p:sldIdLst>
-    <p:sldId id="256" r:id="rId2"/>
-    <p:sldId id="257" r:id="rId3"/>
-    <p:sldId id="258" r:id="rId4"/>
-    <p:sldId id="259" r:id="rId5"/>
-    <p:sldId id="260" r:id="rId6"/>
-    <p:sldId id="261" r:id="rId7"/>
+    <p:sldId id="271" r:id="rId2"/>
+    <p:sldId id="272" r:id="rId3"/>
+    <p:sldId id="256" r:id="rId4"/>
+    <p:sldId id="257" r:id="rId5"/>
+    <p:sldId id="258" r:id="rId6"/>
+    <p:sldId id="259" r:id="rId7"/>
+    <p:sldId id="273" r:id="rId8"/>
+    <p:sldId id="278" r:id="rId9"/>
+    <p:sldId id="260" r:id="rId10"/>
+    <p:sldId id="275" r:id="rId11"/>
+    <p:sldId id="276" r:id="rId12"/>
+    <p:sldId id="277" r:id="rId13"/>
   </p:sldIdLst>
   <p:sldSz cx="12192000" cy="6858000"/>
   <p:notesSz cx="6858000" cy="9144000"/>
@@ -109,7 +115,364 @@
       </a:defRPr>
     </a:lvl9pPr>
   </p:defaultTextStyle>
+  <p:extLst>
+    <p:ext uri="{EFAFB233-063F-42B5-8137-9DF3F51BA10A}">
+      <p15:sldGuideLst xmlns:p15="http://schemas.microsoft.com/office/powerpoint/2012/main"/>
+    </p:ext>
+  </p:extLst>
 </p:presentation>
+</file>
+
+<file path=ppt/revisionInfo.xml><?xml version="1.0" encoding="utf-8"?>
+<p1510:revInfo xmlns:a="http://schemas.openxmlformats.org/drawingml/2006/main" xmlns:r="http://schemas.openxmlformats.org/officeDocument/2006/relationships" xmlns:p1510="http://schemas.microsoft.com/office/powerpoint/2015/10/main">
+  <p1510:revLst>
+    <p1510:client id="{0F9EE1A5-45E0-40C5-8585-16DF0DF772CD}" v="4664" dt="2018-10-05T05:12:42.750"/>
+  </p1510:revLst>
+</p1510:revInfo>
+</file>
+
+<file path=ppt/changesInfos/changesInfo1.xml><?xml version="1.0" encoding="utf-8"?>
+<pc:chgInfo xmlns:a="http://schemas.openxmlformats.org/drawingml/2006/main" xmlns:r="http://schemas.openxmlformats.org/officeDocument/2006/relationships" xmlns:ac="http://schemas.microsoft.com/office/drawing/2013/main/command" xmlns:pc="http://schemas.microsoft.com/office/powerpoint/2013/main/command">
+  <pc:docChgLst>
+    <pc:chgData name="Arunabh Ghosh" userId="7064b204c6fa9c53" providerId="LiveId" clId="{0F9EE1A5-45E0-40C5-8585-16DF0DF772CD}"/>
+    <pc:docChg chg="undo custSel addSld delSld modSld sldOrd">
+      <pc:chgData name="Arunabh Ghosh" userId="7064b204c6fa9c53" providerId="LiveId" clId="{0F9EE1A5-45E0-40C5-8585-16DF0DF772CD}" dt="2018-10-05T05:12:42.750" v="4662" actId="20577"/>
+      <pc:docMkLst>
+        <pc:docMk/>
+      </pc:docMkLst>
+      <pc:sldChg chg="addSp delSp">
+        <pc:chgData name="Arunabh Ghosh" userId="7064b204c6fa9c53" providerId="LiveId" clId="{0F9EE1A5-45E0-40C5-8585-16DF0DF772CD}" dt="2018-10-04T14:28:15.316" v="604" actId="478"/>
+        <pc:sldMkLst>
+          <pc:docMk/>
+          <pc:sldMk cId="1051860008" sldId="256"/>
+        </pc:sldMkLst>
+        <pc:spChg chg="add del">
+          <ac:chgData name="Arunabh Ghosh" userId="7064b204c6fa9c53" providerId="LiveId" clId="{0F9EE1A5-45E0-40C5-8585-16DF0DF772CD}" dt="2018-10-04T14:28:15.316" v="604" actId="478"/>
+          <ac:spMkLst>
+            <pc:docMk/>
+            <pc:sldMk cId="1051860008" sldId="256"/>
+            <ac:spMk id="2" creationId="{67AB7E48-352F-47C4-B38B-6E1EB61DCF4C}"/>
+          </ac:spMkLst>
+        </pc:spChg>
+        <pc:spChg chg="add del">
+          <ac:chgData name="Arunabh Ghosh" userId="7064b204c6fa9c53" providerId="LiveId" clId="{0F9EE1A5-45E0-40C5-8585-16DF0DF772CD}" dt="2018-10-04T14:24:09.214" v="4"/>
+          <ac:spMkLst>
+            <pc:docMk/>
+            <pc:sldMk cId="1051860008" sldId="256"/>
+            <ac:spMk id="3" creationId="{4E97AF57-DF53-4CD3-A269-DEE8BE1F8E73}"/>
+          </ac:spMkLst>
+        </pc:spChg>
+      </pc:sldChg>
+      <pc:sldChg chg="addSp delSp">
+        <pc:chgData name="Arunabh Ghosh" userId="7064b204c6fa9c53" providerId="LiveId" clId="{0F9EE1A5-45E0-40C5-8585-16DF0DF772CD}" dt="2018-10-04T14:24:03.316" v="2"/>
+        <pc:sldMkLst>
+          <pc:docMk/>
+          <pc:sldMk cId="2807756597" sldId="257"/>
+        </pc:sldMkLst>
+        <pc:spChg chg="add del">
+          <ac:chgData name="Arunabh Ghosh" userId="7064b204c6fa9c53" providerId="LiveId" clId="{0F9EE1A5-45E0-40C5-8585-16DF0DF772CD}" dt="2018-10-04T14:24:03.316" v="2"/>
+          <ac:spMkLst>
+            <pc:docMk/>
+            <pc:sldMk cId="2807756597" sldId="257"/>
+            <ac:spMk id="4" creationId="{EBA9DD60-E4C9-4C23-B666-1CEC4A33EFD4}"/>
+          </ac:spMkLst>
+        </pc:spChg>
+      </pc:sldChg>
+      <pc:sldChg chg="modSp">
+        <pc:chgData name="Arunabh Ghosh" userId="7064b204c6fa9c53" providerId="LiveId" clId="{0F9EE1A5-45E0-40C5-8585-16DF0DF772CD}" dt="2018-10-04T14:30:09.450" v="787" actId="313"/>
+        <pc:sldMkLst>
+          <pc:docMk/>
+          <pc:sldMk cId="2445879125" sldId="259"/>
+        </pc:sldMkLst>
+        <pc:spChg chg="mod">
+          <ac:chgData name="Arunabh Ghosh" userId="7064b204c6fa9c53" providerId="LiveId" clId="{0F9EE1A5-45E0-40C5-8585-16DF0DF772CD}" dt="2018-10-04T14:30:09.450" v="787" actId="313"/>
+          <ac:spMkLst>
+            <pc:docMk/>
+            <pc:sldMk cId="2445879125" sldId="259"/>
+            <ac:spMk id="3" creationId="{3E0C8A42-3F4A-4F82-B3D8-F2B8E0A92359}"/>
+          </ac:spMkLst>
+        </pc:spChg>
+      </pc:sldChg>
+      <pc:sldChg chg="modSp ord">
+        <pc:chgData name="Arunabh Ghosh" userId="7064b204c6fa9c53" providerId="LiveId" clId="{0F9EE1A5-45E0-40C5-8585-16DF0DF772CD}" dt="2018-10-04T14:45:56.471" v="1891" actId="20577"/>
+        <pc:sldMkLst>
+          <pc:docMk/>
+          <pc:sldMk cId="1870594804" sldId="260"/>
+        </pc:sldMkLst>
+        <pc:spChg chg="mod">
+          <ac:chgData name="Arunabh Ghosh" userId="7064b204c6fa9c53" providerId="LiveId" clId="{0F9EE1A5-45E0-40C5-8585-16DF0DF772CD}" dt="2018-10-04T14:45:56.471" v="1891" actId="20577"/>
+          <ac:spMkLst>
+            <pc:docMk/>
+            <pc:sldMk cId="1870594804" sldId="260"/>
+            <ac:spMk id="3" creationId="{0668C4A0-FF12-49CB-9BA1-530BFEE738E5}"/>
+          </ac:spMkLst>
+        </pc:spChg>
+      </pc:sldChg>
+      <pc:sldChg chg="del">
+        <pc:chgData name="Arunabh Ghosh" userId="7064b204c6fa9c53" providerId="LiveId" clId="{0F9EE1A5-45E0-40C5-8585-16DF0DF772CD}" dt="2018-10-04T15:11:59.519" v="3183" actId="2696"/>
+        <pc:sldMkLst>
+          <pc:docMk/>
+          <pc:sldMk cId="2667553124" sldId="261"/>
+        </pc:sldMkLst>
+      </pc:sldChg>
+      <pc:sldChg chg="add ord">
+        <pc:chgData name="Arunabh Ghosh" userId="7064b204c6fa9c53" providerId="LiveId" clId="{0F9EE1A5-45E0-40C5-8585-16DF0DF772CD}" dt="2018-10-04T14:24:25.461" v="6"/>
+        <pc:sldMkLst>
+          <pc:docMk/>
+          <pc:sldMk cId="2095033102" sldId="271"/>
+        </pc:sldMkLst>
+      </pc:sldChg>
+      <pc:sldChg chg="modSp add">
+        <pc:chgData name="Arunabh Ghosh" userId="7064b204c6fa9c53" providerId="LiveId" clId="{0F9EE1A5-45E0-40C5-8585-16DF0DF772CD}" dt="2018-10-04T14:29:00.629" v="658" actId="20577"/>
+        <pc:sldMkLst>
+          <pc:docMk/>
+          <pc:sldMk cId="1717155405" sldId="272"/>
+        </pc:sldMkLst>
+        <pc:spChg chg="mod">
+          <ac:chgData name="Arunabh Ghosh" userId="7064b204c6fa9c53" providerId="LiveId" clId="{0F9EE1A5-45E0-40C5-8585-16DF0DF772CD}" dt="2018-10-04T14:25:54.036" v="187" actId="20577"/>
+          <ac:spMkLst>
+            <pc:docMk/>
+            <pc:sldMk cId="1717155405" sldId="272"/>
+            <ac:spMk id="2" creationId="{1F1A41F1-6761-4927-8199-1B5EB4AE3099}"/>
+          </ac:spMkLst>
+        </pc:spChg>
+        <pc:spChg chg="mod">
+          <ac:chgData name="Arunabh Ghosh" userId="7064b204c6fa9c53" providerId="LiveId" clId="{0F9EE1A5-45E0-40C5-8585-16DF0DF772CD}" dt="2018-10-04T14:29:00.629" v="658" actId="20577"/>
+          <ac:spMkLst>
+            <pc:docMk/>
+            <pc:sldMk cId="1717155405" sldId="272"/>
+            <ac:spMk id="3" creationId="{31121FA5-35DC-4D7A-A42A-935EEFB617F3}"/>
+          </ac:spMkLst>
+        </pc:spChg>
+      </pc:sldChg>
+      <pc:sldChg chg="modSp add">
+        <pc:chgData name="Arunabh Ghosh" userId="7064b204c6fa9c53" providerId="LiveId" clId="{0F9EE1A5-45E0-40C5-8585-16DF0DF772CD}" dt="2018-10-04T14:35:04.020" v="1434" actId="20577"/>
+        <pc:sldMkLst>
+          <pc:docMk/>
+          <pc:sldMk cId="1893414765" sldId="273"/>
+        </pc:sldMkLst>
+        <pc:spChg chg="mod">
+          <ac:chgData name="Arunabh Ghosh" userId="7064b204c6fa9c53" providerId="LiveId" clId="{0F9EE1A5-45E0-40C5-8585-16DF0DF772CD}" dt="2018-10-04T14:30:27.757" v="810" actId="20577"/>
+          <ac:spMkLst>
+            <pc:docMk/>
+            <pc:sldMk cId="1893414765" sldId="273"/>
+            <ac:spMk id="2" creationId="{4D2429B0-40FB-4285-B4B8-3660D37C30CA}"/>
+          </ac:spMkLst>
+        </pc:spChg>
+        <pc:spChg chg="mod">
+          <ac:chgData name="Arunabh Ghosh" userId="7064b204c6fa9c53" providerId="LiveId" clId="{0F9EE1A5-45E0-40C5-8585-16DF0DF772CD}" dt="2018-10-04T14:35:04.020" v="1434" actId="20577"/>
+          <ac:spMkLst>
+            <pc:docMk/>
+            <pc:sldMk cId="1893414765" sldId="273"/>
+            <ac:spMk id="3" creationId="{BAB7881F-478E-486C-9B48-41A41D8AA9B3}"/>
+          </ac:spMkLst>
+        </pc:spChg>
+      </pc:sldChg>
+      <pc:sldChg chg="modSp add del">
+        <pc:chgData name="Arunabh Ghosh" userId="7064b204c6fa9c53" providerId="LiveId" clId="{0F9EE1A5-45E0-40C5-8585-16DF0DF772CD}" dt="2018-10-04T14:46:26.160" v="1893" actId="2696"/>
+        <pc:sldMkLst>
+          <pc:docMk/>
+          <pc:sldMk cId="1940263534" sldId="274"/>
+        </pc:sldMkLst>
+        <pc:spChg chg="mod">
+          <ac:chgData name="Arunabh Ghosh" userId="7064b204c6fa9c53" providerId="LiveId" clId="{0F9EE1A5-45E0-40C5-8585-16DF0DF772CD}" dt="2018-10-04T14:41:35.240" v="1476" actId="20577"/>
+          <ac:spMkLst>
+            <pc:docMk/>
+            <pc:sldMk cId="1940263534" sldId="274"/>
+            <ac:spMk id="2" creationId="{4A8A6FED-0DC8-4307-AB16-F81B3F4BF97C}"/>
+          </ac:spMkLst>
+        </pc:spChg>
+      </pc:sldChg>
+      <pc:sldChg chg="modSp add">
+        <pc:chgData name="Arunabh Ghosh" userId="7064b204c6fa9c53" providerId="LiveId" clId="{0F9EE1A5-45E0-40C5-8585-16DF0DF772CD}" dt="2018-10-04T14:54:30.289" v="2613" actId="20577"/>
+        <pc:sldMkLst>
+          <pc:docMk/>
+          <pc:sldMk cId="1493610363" sldId="275"/>
+        </pc:sldMkLst>
+        <pc:spChg chg="mod">
+          <ac:chgData name="Arunabh Ghosh" userId="7064b204c6fa9c53" providerId="LiveId" clId="{0F9EE1A5-45E0-40C5-8585-16DF0DF772CD}" dt="2018-10-04T14:46:59.105" v="1936" actId="20577"/>
+          <ac:spMkLst>
+            <pc:docMk/>
+            <pc:sldMk cId="1493610363" sldId="275"/>
+            <ac:spMk id="2" creationId="{40BC8C4D-6A8B-4003-8B5D-A5A4A5C56560}"/>
+          </ac:spMkLst>
+        </pc:spChg>
+        <pc:spChg chg="mod">
+          <ac:chgData name="Arunabh Ghosh" userId="7064b204c6fa9c53" providerId="LiveId" clId="{0F9EE1A5-45E0-40C5-8585-16DF0DF772CD}" dt="2018-10-04T14:54:30.289" v="2613" actId="20577"/>
+          <ac:spMkLst>
+            <pc:docMk/>
+            <pc:sldMk cId="1493610363" sldId="275"/>
+            <ac:spMk id="3" creationId="{18C7C280-DFDD-4CF3-BAB6-56CA4BEB7A70}"/>
+          </ac:spMkLst>
+        </pc:spChg>
+      </pc:sldChg>
+      <pc:sldChg chg="addSp delSp modSp add">
+        <pc:chgData name="Arunabh Ghosh" userId="7064b204c6fa9c53" providerId="LiveId" clId="{0F9EE1A5-45E0-40C5-8585-16DF0DF772CD}" dt="2018-10-04T15:45:56.689" v="3186" actId="478"/>
+        <pc:sldMkLst>
+          <pc:docMk/>
+          <pc:sldMk cId="382404950" sldId="276"/>
+        </pc:sldMkLst>
+        <pc:spChg chg="mod">
+          <ac:chgData name="Arunabh Ghosh" userId="7064b204c6fa9c53" providerId="LiveId" clId="{0F9EE1A5-45E0-40C5-8585-16DF0DF772CD}" dt="2018-10-04T14:56:06.592" v="2661" actId="20577"/>
+          <ac:spMkLst>
+            <pc:docMk/>
+            <pc:sldMk cId="382404950" sldId="276"/>
+            <ac:spMk id="2" creationId="{8B77BF3D-7C68-4C11-AC41-BF1AD83D1532}"/>
+          </ac:spMkLst>
+        </pc:spChg>
+        <pc:spChg chg="mod">
+          <ac:chgData name="Arunabh Ghosh" userId="7064b204c6fa9c53" providerId="LiveId" clId="{0F9EE1A5-45E0-40C5-8585-16DF0DF772CD}" dt="2018-10-04T15:11:26.393" v="3182" actId="20577"/>
+          <ac:spMkLst>
+            <pc:docMk/>
+            <pc:sldMk cId="382404950" sldId="276"/>
+            <ac:spMk id="3" creationId="{F5453F15-BC1A-46EE-978C-4887FB8F67FB}"/>
+          </ac:spMkLst>
+        </pc:spChg>
+        <pc:spChg chg="add del mod">
+          <ac:chgData name="Arunabh Ghosh" userId="7064b204c6fa9c53" providerId="LiveId" clId="{0F9EE1A5-45E0-40C5-8585-16DF0DF772CD}" dt="2018-10-04T15:45:56.689" v="3186" actId="478"/>
+          <ac:spMkLst>
+            <pc:docMk/>
+            <pc:sldMk cId="382404950" sldId="276"/>
+            <ac:spMk id="6" creationId="{5CC742B0-7CCD-4DBC-89AE-A91CE7857610}"/>
+          </ac:spMkLst>
+        </pc:spChg>
+        <pc:picChg chg="add del mod">
+          <ac:chgData name="Arunabh Ghosh" userId="7064b204c6fa9c53" providerId="LiveId" clId="{0F9EE1A5-45E0-40C5-8585-16DF0DF772CD}" dt="2018-10-04T15:08:52.659" v="2803" actId="478"/>
+          <ac:picMkLst>
+            <pc:docMk/>
+            <pc:sldMk cId="382404950" sldId="276"/>
+            <ac:picMk id="4" creationId="{FF0FBCA6-04D6-4C89-8437-392D6BBDF8B0}"/>
+          </ac:picMkLst>
+        </pc:picChg>
+        <pc:picChg chg="add del mod">
+          <ac:chgData name="Arunabh Ghosh" userId="7064b204c6fa9c53" providerId="LiveId" clId="{0F9EE1A5-45E0-40C5-8585-16DF0DF772CD}" dt="2018-10-04T15:08:48.216" v="2801" actId="478"/>
+          <ac:picMkLst>
+            <pc:docMk/>
+            <pc:sldMk cId="382404950" sldId="276"/>
+            <ac:picMk id="5" creationId="{77AD40ED-CC67-4F34-B5E5-C8EE1E1AE853}"/>
+          </ac:picMkLst>
+        </pc:picChg>
+      </pc:sldChg>
+      <pc:sldChg chg="modSp add">
+        <pc:chgData name="Arunabh Ghosh" userId="7064b204c6fa9c53" providerId="LiveId" clId="{0F9EE1A5-45E0-40C5-8585-16DF0DF772CD}" dt="2018-10-04T16:14:55.468" v="4487" actId="20577"/>
+        <pc:sldMkLst>
+          <pc:docMk/>
+          <pc:sldMk cId="3177975569" sldId="277"/>
+        </pc:sldMkLst>
+        <pc:spChg chg="mod">
+          <ac:chgData name="Arunabh Ghosh" userId="7064b204c6fa9c53" providerId="LiveId" clId="{0F9EE1A5-45E0-40C5-8585-16DF0DF772CD}" dt="2018-10-04T15:56:52.922" v="3215" actId="20577"/>
+          <ac:spMkLst>
+            <pc:docMk/>
+            <pc:sldMk cId="3177975569" sldId="277"/>
+            <ac:spMk id="2" creationId="{5373971B-17BB-49A2-BBD3-D5E5BBDA671B}"/>
+          </ac:spMkLst>
+        </pc:spChg>
+        <pc:spChg chg="mod">
+          <ac:chgData name="Arunabh Ghosh" userId="7064b204c6fa9c53" providerId="LiveId" clId="{0F9EE1A5-45E0-40C5-8585-16DF0DF772CD}" dt="2018-10-04T16:14:55.468" v="4487" actId="20577"/>
+          <ac:spMkLst>
+            <pc:docMk/>
+            <pc:sldMk cId="3177975569" sldId="277"/>
+            <ac:spMk id="3" creationId="{86171C31-94DF-4D94-A2C8-ABBC19F88DDA}"/>
+          </ac:spMkLst>
+        </pc:spChg>
+      </pc:sldChg>
+      <pc:sldChg chg="modSp add del">
+        <pc:chgData name="Arunabh Ghosh" userId="7064b204c6fa9c53" providerId="LiveId" clId="{0F9EE1A5-45E0-40C5-8585-16DF0DF772CD}" dt="2018-10-04T20:11:12.033" v="4574" actId="2696"/>
+        <pc:sldMkLst>
+          <pc:docMk/>
+          <pc:sldMk cId="1134907500" sldId="278"/>
+        </pc:sldMkLst>
+        <pc:spChg chg="mod">
+          <ac:chgData name="Arunabh Ghosh" userId="7064b204c6fa9c53" providerId="LiveId" clId="{0F9EE1A5-45E0-40C5-8585-16DF0DF772CD}" dt="2018-10-04T20:09:00.616" v="4495" actId="20577"/>
+          <ac:spMkLst>
+            <pc:docMk/>
+            <pc:sldMk cId="1134907500" sldId="278"/>
+            <ac:spMk id="2" creationId="{E1EF19D9-C9CF-49A0-8A85-AFE07F3EE44B}"/>
+          </ac:spMkLst>
+        </pc:spChg>
+        <pc:spChg chg="mod">
+          <ac:chgData name="Arunabh Ghosh" userId="7064b204c6fa9c53" providerId="LiveId" clId="{0F9EE1A5-45E0-40C5-8585-16DF0DF772CD}" dt="2018-10-04T20:09:21.445" v="4573" actId="20577"/>
+          <ac:spMkLst>
+            <pc:docMk/>
+            <pc:sldMk cId="1134907500" sldId="278"/>
+            <ac:spMk id="3" creationId="{966F31A4-BEF5-495E-9B52-051CCD76A4FD}"/>
+          </ac:spMkLst>
+        </pc:spChg>
+      </pc:sldChg>
+      <pc:sldChg chg="addSp delSp modSp add ord">
+        <pc:chgData name="Arunabh Ghosh" userId="7064b204c6fa9c53" providerId="LiveId" clId="{0F9EE1A5-45E0-40C5-8585-16DF0DF772CD}" dt="2018-10-05T05:12:42.750" v="4662" actId="20577"/>
+        <pc:sldMkLst>
+          <pc:docMk/>
+          <pc:sldMk cId="1233497862" sldId="278"/>
+        </pc:sldMkLst>
+        <pc:spChg chg="mod">
+          <ac:chgData name="Arunabh Ghosh" userId="7064b204c6fa9c53" providerId="LiveId" clId="{0F9EE1A5-45E0-40C5-8585-16DF0DF772CD}" dt="2018-10-05T05:09:09.859" v="4601" actId="20577"/>
+          <ac:spMkLst>
+            <pc:docMk/>
+            <pc:sldMk cId="1233497862" sldId="278"/>
+            <ac:spMk id="2" creationId="{18B8F609-735F-4205-BD77-F418FE61C042}"/>
+          </ac:spMkLst>
+        </pc:spChg>
+        <pc:spChg chg="del">
+          <ac:chgData name="Arunabh Ghosh" userId="7064b204c6fa9c53" providerId="LiveId" clId="{0F9EE1A5-45E0-40C5-8585-16DF0DF772CD}" dt="2018-10-05T05:09:24.703" v="4602"/>
+          <ac:spMkLst>
+            <pc:docMk/>
+            <pc:sldMk cId="1233497862" sldId="278"/>
+            <ac:spMk id="3" creationId="{AEDA6803-60EF-4518-AB3A-E4053AF5ED66}"/>
+          </ac:spMkLst>
+        </pc:spChg>
+        <pc:spChg chg="add mod">
+          <ac:chgData name="Arunabh Ghosh" userId="7064b204c6fa9c53" providerId="LiveId" clId="{0F9EE1A5-45E0-40C5-8585-16DF0DF772CD}" dt="2018-10-05T05:12:42.750" v="4662" actId="20577"/>
+          <ac:spMkLst>
+            <pc:docMk/>
+            <pc:sldMk cId="1233497862" sldId="278"/>
+            <ac:spMk id="10" creationId="{41CFB75E-E06E-46C9-B669-5D5843E0989D}"/>
+          </ac:spMkLst>
+        </pc:spChg>
+        <pc:spChg chg="add mod">
+          <ac:chgData name="Arunabh Ghosh" userId="7064b204c6fa9c53" providerId="LiveId" clId="{0F9EE1A5-45E0-40C5-8585-16DF0DF772CD}" dt="2018-10-05T05:12:28.232" v="4655" actId="20577"/>
+          <ac:spMkLst>
+            <pc:docMk/>
+            <pc:sldMk cId="1233497862" sldId="278"/>
+            <ac:spMk id="11" creationId="{F7A4D3BB-D696-4644-80D4-B9C1D32F1B68}"/>
+          </ac:spMkLst>
+        </pc:spChg>
+        <pc:spChg chg="add mod">
+          <ac:chgData name="Arunabh Ghosh" userId="7064b204c6fa9c53" providerId="LiveId" clId="{0F9EE1A5-45E0-40C5-8585-16DF0DF772CD}" dt="2018-10-05T05:12:30.575" v="4657" actId="20577"/>
+          <ac:spMkLst>
+            <pc:docMk/>
+            <pc:sldMk cId="1233497862" sldId="278"/>
+            <ac:spMk id="12" creationId="{FE4FB56C-F2EF-4D92-A0A0-96EEC545CB75}"/>
+          </ac:spMkLst>
+        </pc:spChg>
+        <pc:picChg chg="add mod modCrop">
+          <ac:chgData name="Arunabh Ghosh" userId="7064b204c6fa9c53" providerId="LiveId" clId="{0F9EE1A5-45E0-40C5-8585-16DF0DF772CD}" dt="2018-10-05T05:11:35.823" v="4628" actId="1076"/>
+          <ac:picMkLst>
+            <pc:docMk/>
+            <pc:sldMk cId="1233497862" sldId="278"/>
+            <ac:picMk id="5" creationId="{C886505A-ACC9-48D7-8AF1-C424E482D686}"/>
+          </ac:picMkLst>
+        </pc:picChg>
+        <pc:picChg chg="add mod modCrop">
+          <ac:chgData name="Arunabh Ghosh" userId="7064b204c6fa9c53" providerId="LiveId" clId="{0F9EE1A5-45E0-40C5-8585-16DF0DF772CD}" dt="2018-10-05T05:11:39.731" v="4629" actId="1076"/>
+          <ac:picMkLst>
+            <pc:docMk/>
+            <pc:sldMk cId="1233497862" sldId="278"/>
+            <ac:picMk id="7" creationId="{B2776A9A-88C2-4E5A-971E-917D5DEDD260}"/>
+          </ac:picMkLst>
+        </pc:picChg>
+        <pc:picChg chg="add mod modCrop">
+          <ac:chgData name="Arunabh Ghosh" userId="7064b204c6fa9c53" providerId="LiveId" clId="{0F9EE1A5-45E0-40C5-8585-16DF0DF772CD}" dt="2018-10-05T05:11:44.057" v="4630" actId="1076"/>
+          <ac:picMkLst>
+            <pc:docMk/>
+            <pc:sldMk cId="1233497862" sldId="278"/>
+            <ac:picMk id="9" creationId="{BE0199C9-0F02-4201-8CB1-AD1073115F14}"/>
+          </ac:picMkLst>
+        </pc:picChg>
+      </pc:sldChg>
+    </pc:docChg>
+  </pc:docChgLst>
+</pc:chgInfo>
 </file>
 
 <file path=ppt/slideLayouts/slideLayout1.xml><?xml version="1.0" encoding="utf-8"?>
@@ -261,7 +624,7 @@
           <a:p>
             <a:fld id="{84F94633-66C9-4EDB-A9E1-5CEE1AC864C8}" type="datetimeFigureOut">
               <a:rPr lang="en-IN" smtClean="0"/>
-              <a:t>02-10-2018</a:t>
+              <a:t>05-10-2018</a:t>
             </a:fld>
             <a:endParaRPr lang="en-IN"/>
           </a:p>
@@ -461,7 +824,7 @@
           <a:p>
             <a:fld id="{84F94633-66C9-4EDB-A9E1-5CEE1AC864C8}" type="datetimeFigureOut">
               <a:rPr lang="en-IN" smtClean="0"/>
-              <a:t>02-10-2018</a:t>
+              <a:t>05-10-2018</a:t>
             </a:fld>
             <a:endParaRPr lang="en-IN"/>
           </a:p>
@@ -671,7 +1034,7 @@
           <a:p>
             <a:fld id="{84F94633-66C9-4EDB-A9E1-5CEE1AC864C8}" type="datetimeFigureOut">
               <a:rPr lang="en-IN" smtClean="0"/>
-              <a:t>02-10-2018</a:t>
+              <a:t>05-10-2018</a:t>
             </a:fld>
             <a:endParaRPr lang="en-IN"/>
           </a:p>
@@ -871,7 +1234,7 @@
           <a:p>
             <a:fld id="{84F94633-66C9-4EDB-A9E1-5CEE1AC864C8}" type="datetimeFigureOut">
               <a:rPr lang="en-IN" smtClean="0"/>
-              <a:t>02-10-2018</a:t>
+              <a:t>05-10-2018</a:t>
             </a:fld>
             <a:endParaRPr lang="en-IN"/>
           </a:p>
@@ -1147,7 +1510,7 @@
           <a:p>
             <a:fld id="{84F94633-66C9-4EDB-A9E1-5CEE1AC864C8}" type="datetimeFigureOut">
               <a:rPr lang="en-IN" smtClean="0"/>
-              <a:t>02-10-2018</a:t>
+              <a:t>05-10-2018</a:t>
             </a:fld>
             <a:endParaRPr lang="en-IN"/>
           </a:p>
@@ -1415,7 +1778,7 @@
           <a:p>
             <a:fld id="{84F94633-66C9-4EDB-A9E1-5CEE1AC864C8}" type="datetimeFigureOut">
               <a:rPr lang="en-IN" smtClean="0"/>
-              <a:t>02-10-2018</a:t>
+              <a:t>05-10-2018</a:t>
             </a:fld>
             <a:endParaRPr lang="en-IN"/>
           </a:p>
@@ -1830,7 +2193,7 @@
           <a:p>
             <a:fld id="{84F94633-66C9-4EDB-A9E1-5CEE1AC864C8}" type="datetimeFigureOut">
               <a:rPr lang="en-IN" smtClean="0"/>
-              <a:t>02-10-2018</a:t>
+              <a:t>05-10-2018</a:t>
             </a:fld>
             <a:endParaRPr lang="en-IN"/>
           </a:p>
@@ -1972,7 +2335,7 @@
           <a:p>
             <a:fld id="{84F94633-66C9-4EDB-A9E1-5CEE1AC864C8}" type="datetimeFigureOut">
               <a:rPr lang="en-IN" smtClean="0"/>
-              <a:t>02-10-2018</a:t>
+              <a:t>05-10-2018</a:t>
             </a:fld>
             <a:endParaRPr lang="en-IN"/>
           </a:p>
@@ -2085,7 +2448,7 @@
           <a:p>
             <a:fld id="{84F94633-66C9-4EDB-A9E1-5CEE1AC864C8}" type="datetimeFigureOut">
               <a:rPr lang="en-IN" smtClean="0"/>
-              <a:t>02-10-2018</a:t>
+              <a:t>05-10-2018</a:t>
             </a:fld>
             <a:endParaRPr lang="en-IN"/>
           </a:p>
@@ -2398,7 +2761,7 @@
           <a:p>
             <a:fld id="{84F94633-66C9-4EDB-A9E1-5CEE1AC864C8}" type="datetimeFigureOut">
               <a:rPr lang="en-IN" smtClean="0"/>
-              <a:t>02-10-2018</a:t>
+              <a:t>05-10-2018</a:t>
             </a:fld>
             <a:endParaRPr lang="en-IN"/>
           </a:p>
@@ -2687,7 +3050,7 @@
           <a:p>
             <a:fld id="{84F94633-66C9-4EDB-A9E1-5CEE1AC864C8}" type="datetimeFigureOut">
               <a:rPr lang="en-IN" smtClean="0"/>
-              <a:t>02-10-2018</a:t>
+              <a:t>05-10-2018</a:t>
             </a:fld>
             <a:endParaRPr lang="en-IN"/>
           </a:p>
@@ -2930,7 +3293,7 @@
           <a:p>
             <a:fld id="{84F94633-66C9-4EDB-A9E1-5CEE1AC864C8}" type="datetimeFigureOut">
               <a:rPr lang="en-IN" smtClean="0"/>
-              <a:t>02-10-2018</a:t>
+              <a:t>05-10-2018</a:t>
             </a:fld>
             <a:endParaRPr lang="en-IN"/>
           </a:p>
@@ -3349,10 +3712,245 @@
       </p:grpSpPr>
       <p:sp>
         <p:nvSpPr>
-          <p:cNvPr id="5" name="Title 4">
-            <a:extLst>
-              <a:ext uri="{FF2B5EF4-FFF2-40B4-BE49-F238E27FC236}">
-                <a16:creationId xmlns:a16="http://schemas.microsoft.com/office/drawing/2014/main" id="{42D91FF4-5CA2-43A8-91E0-275D3860838C}"/>
+          <p:cNvPr id="2" name="Title 1">
+            <a:extLst>
+              <a:ext uri="{FF2B5EF4-FFF2-40B4-BE49-F238E27FC236}">
+                <a16:creationId xmlns:a16="http://schemas.microsoft.com/office/drawing/2014/main" id="{2A58C25F-B24D-4A4A-BC49-4CA6AF1085D2}"/>
+              </a:ext>
+            </a:extLst>
+          </p:cNvPr>
+          <p:cNvSpPr>
+            <a:spLocks noGrp="1"/>
+          </p:cNvSpPr>
+          <p:nvPr>
+            <p:ph type="title"/>
+          </p:nvPr>
+        </p:nvSpPr>
+        <p:spPr>
+          <a:xfrm>
+            <a:off x="838200" y="365125"/>
+            <a:ext cx="10515600" cy="1325563"/>
+          </a:xfrm>
+        </p:spPr>
+        <p:txBody>
+          <a:bodyPr/>
+          <a:lstStyle/>
+          <a:p>
+            <a:r>
+              <a:rPr lang="en-IN" dirty="0"/>
+              <a:t>Heterogeneity in Tomography</a:t>
+            </a:r>
+          </a:p>
+        </p:txBody>
+      </p:sp>
+      <p:sp>
+        <p:nvSpPr>
+          <p:cNvPr id="3" name="Content Placeholder 2">
+            <a:extLst>
+              <a:ext uri="{FF2B5EF4-FFF2-40B4-BE49-F238E27FC236}">
+                <a16:creationId xmlns:a16="http://schemas.microsoft.com/office/drawing/2014/main" id="{67D46AB8-2D51-4FB6-B64F-1E643F17EF53}"/>
+              </a:ext>
+            </a:extLst>
+          </p:cNvPr>
+          <p:cNvSpPr>
+            <a:spLocks noGrp="1"/>
+          </p:cNvSpPr>
+          <p:nvPr>
+            <p:ph idx="1"/>
+          </p:nvPr>
+        </p:nvSpPr>
+        <p:spPr>
+          <a:xfrm>
+            <a:off x="838200" y="1825625"/>
+            <a:ext cx="10515600" cy="4351338"/>
+          </a:xfrm>
+        </p:spPr>
+        <p:txBody>
+          <a:bodyPr/>
+          <a:lstStyle/>
+          <a:p>
+            <a:r>
+              <a:rPr lang="en-US" dirty="0"/>
+              <a:t>Three classes of object</a:t>
+            </a:r>
+          </a:p>
+          <a:p>
+            <a:endParaRPr lang="en-US" dirty="0"/>
+          </a:p>
+          <a:p>
+            <a:endParaRPr lang="en-US" dirty="0"/>
+          </a:p>
+          <a:p>
+            <a:endParaRPr lang="en-US" dirty="0"/>
+          </a:p>
+          <a:p>
+            <a:endParaRPr lang="en-US" dirty="0"/>
+          </a:p>
+          <a:p>
+            <a:pPr marL="0" indent="0">
+              <a:buNone/>
+            </a:pPr>
+            <a:endParaRPr lang="en-US" dirty="0"/>
+          </a:p>
+          <a:p>
+            <a:r>
+              <a:rPr lang="en-US" dirty="0"/>
+              <a:t>30000 projections are taken from the three classes of objects shown above. Our first task is to cluster the projections such that each cluster contains projections from just one class.  </a:t>
+            </a:r>
+            <a:endParaRPr lang="en-IN" dirty="0"/>
+          </a:p>
+          <a:p>
+            <a:pPr marL="0" indent="0">
+              <a:buNone/>
+            </a:pPr>
+            <a:endParaRPr lang="en-US" dirty="0"/>
+          </a:p>
+        </p:txBody>
+      </p:sp>
+      <p:pic>
+        <p:nvPicPr>
+          <p:cNvPr id="5" name="Picture 4" descr="A close up of a logo&#10;&#10;Description generated with high confidence">
+            <a:extLst>
+              <a:ext uri="{FF2B5EF4-FFF2-40B4-BE49-F238E27FC236}">
+                <a16:creationId xmlns:a16="http://schemas.microsoft.com/office/drawing/2014/main" id="{0677AC1A-C693-4EAA-8BBE-0B7B465AFA3A}"/>
+              </a:ext>
+            </a:extLst>
+          </p:cNvPr>
+          <p:cNvPicPr>
+            <a:picLocks noChangeAspect="1"/>
+          </p:cNvPicPr>
+          <p:nvPr/>
+        </p:nvPicPr>
+        <p:blipFill>
+          <a:blip r:embed="rId2">
+            <a:extLst>
+              <a:ext uri="{28A0092B-C50C-407E-A947-70E740481C1C}">
+                <a14:useLocalDpi xmlns:a14="http://schemas.microsoft.com/office/drawing/2010/main" val="0"/>
+              </a:ext>
+            </a:extLst>
+          </a:blip>
+          <a:stretch>
+            <a:fillRect/>
+          </a:stretch>
+        </p:blipFill>
+        <p:spPr>
+          <a:xfrm>
+            <a:off x="1637972" y="2512544"/>
+            <a:ext cx="2053669" cy="2053669"/>
+          </a:xfrm>
+          <a:prstGeom prst="rect">
+            <a:avLst/>
+          </a:prstGeom>
+        </p:spPr>
+      </p:pic>
+      <p:pic>
+        <p:nvPicPr>
+          <p:cNvPr id="7" name="Picture 6" descr="A close up of a logo&#10;&#10;Description generated with high confidence">
+            <a:extLst>
+              <a:ext uri="{FF2B5EF4-FFF2-40B4-BE49-F238E27FC236}">
+                <a16:creationId xmlns:a16="http://schemas.microsoft.com/office/drawing/2014/main" id="{1AA5B4FD-9259-4014-AEFF-D864671CCD70}"/>
+              </a:ext>
+            </a:extLst>
+          </p:cNvPr>
+          <p:cNvPicPr>
+            <a:picLocks noChangeAspect="1"/>
+          </p:cNvPicPr>
+          <p:nvPr/>
+        </p:nvPicPr>
+        <p:blipFill>
+          <a:blip r:embed="rId3">
+            <a:extLst>
+              <a:ext uri="{28A0092B-C50C-407E-A947-70E740481C1C}">
+                <a14:useLocalDpi xmlns:a14="http://schemas.microsoft.com/office/drawing/2010/main" val="0"/>
+              </a:ext>
+            </a:extLst>
+          </a:blip>
+          <a:stretch>
+            <a:fillRect/>
+          </a:stretch>
+        </p:blipFill>
+        <p:spPr>
+          <a:xfrm>
+            <a:off x="5069165" y="2512543"/>
+            <a:ext cx="2053669" cy="2053669"/>
+          </a:xfrm>
+          <a:prstGeom prst="rect">
+            <a:avLst/>
+          </a:prstGeom>
+        </p:spPr>
+      </p:pic>
+      <p:pic>
+        <p:nvPicPr>
+          <p:cNvPr id="9" name="Picture 8" descr="A close up of a logo&#10;&#10;Description generated with high confidence">
+            <a:extLst>
+              <a:ext uri="{FF2B5EF4-FFF2-40B4-BE49-F238E27FC236}">
+                <a16:creationId xmlns:a16="http://schemas.microsoft.com/office/drawing/2014/main" id="{274A4ABD-C6BD-491D-84BE-9B78FCD3B723}"/>
+              </a:ext>
+            </a:extLst>
+          </p:cNvPr>
+          <p:cNvPicPr>
+            <a:picLocks noChangeAspect="1"/>
+          </p:cNvPicPr>
+          <p:nvPr/>
+        </p:nvPicPr>
+        <p:blipFill>
+          <a:blip r:embed="rId4">
+            <a:extLst>
+              <a:ext uri="{28A0092B-C50C-407E-A947-70E740481C1C}">
+                <a14:useLocalDpi xmlns:a14="http://schemas.microsoft.com/office/drawing/2010/main" val="0"/>
+              </a:ext>
+            </a:extLst>
+          </a:blip>
+          <a:stretch>
+            <a:fillRect/>
+          </a:stretch>
+        </p:blipFill>
+        <p:spPr>
+          <a:xfrm>
+            <a:off x="8500358" y="2512543"/>
+            <a:ext cx="2053669" cy="2053669"/>
+          </a:xfrm>
+          <a:prstGeom prst="rect">
+            <a:avLst/>
+          </a:prstGeom>
+        </p:spPr>
+      </p:pic>
+    </p:spTree>
+    <p:extLst>
+      <p:ext uri="{BB962C8B-B14F-4D97-AF65-F5344CB8AC3E}">
+        <p14:creationId xmlns:p14="http://schemas.microsoft.com/office/powerpoint/2010/main" val="2095033102"/>
+      </p:ext>
+    </p:extLst>
+  </p:cSld>
+  <p:clrMapOvr>
+    <a:masterClrMapping/>
+  </p:clrMapOvr>
+</p:sld>
+</file>
+
+<file path=ppt/slides/slide10.xml><?xml version="1.0" encoding="utf-8"?>
+<p:sld xmlns:a="http://schemas.openxmlformats.org/drawingml/2006/main" xmlns:r="http://schemas.openxmlformats.org/officeDocument/2006/relationships" xmlns:p="http://schemas.openxmlformats.org/presentationml/2006/main">
+  <p:cSld>
+    <p:spTree>
+      <p:nvGrpSpPr>
+        <p:cNvPr id="1" name=""/>
+        <p:cNvGrpSpPr/>
+        <p:nvPr/>
+      </p:nvGrpSpPr>
+      <p:grpSpPr>
+        <a:xfrm>
+          <a:off x="0" y="0"/>
+          <a:ext cx="0" cy="0"/>
+          <a:chOff x="0" y="0"/>
+          <a:chExt cx="0" cy="0"/>
+        </a:xfrm>
+      </p:grpSpPr>
+      <p:sp>
+        <p:nvSpPr>
+          <p:cNvPr id="2" name="Title 1">
+            <a:extLst>
+              <a:ext uri="{FF2B5EF4-FFF2-40B4-BE49-F238E27FC236}">
+                <a16:creationId xmlns:a16="http://schemas.microsoft.com/office/drawing/2014/main" id="{40BC8C4D-6A8B-4003-8B5D-A5A4A5C56560}"/>
               </a:ext>
             </a:extLst>
           </p:cNvPr>
@@ -3370,14 +3968,695 @@
           <a:p>
             <a:r>
               <a:rPr lang="en-US" dirty="0"/>
-              <a:t>Clustering based on zeroth-moment</a:t>
+              <a:t>Wrong assignment of classes</a:t>
             </a:r>
             <a:endParaRPr lang="en-IN" dirty="0"/>
           </a:p>
         </p:txBody>
       </p:sp>
-      <mc:AlternateContent xmlns:mc="http://schemas.openxmlformats.org/markup-compatibility/2006">
-        <mc:Choice xmlns:a14="http://schemas.microsoft.com/office/drawing/2010/main" Requires="a14">
+      <p:sp>
+        <p:nvSpPr>
+          <p:cNvPr id="3" name="Content Placeholder 2">
+            <a:extLst>
+              <a:ext uri="{FF2B5EF4-FFF2-40B4-BE49-F238E27FC236}">
+                <a16:creationId xmlns:a16="http://schemas.microsoft.com/office/drawing/2014/main" id="{18C7C280-DFDD-4CF3-BAB6-56CA4BEB7A70}"/>
+              </a:ext>
+            </a:extLst>
+          </p:cNvPr>
+          <p:cNvSpPr>
+            <a:spLocks noGrp="1"/>
+          </p:cNvSpPr>
+          <p:nvPr>
+            <p:ph idx="1"/>
+          </p:nvPr>
+        </p:nvSpPr>
+        <p:spPr/>
+        <p:txBody>
+          <a:bodyPr/>
+          <a:lstStyle/>
+          <a:p>
+            <a:r>
+              <a:rPr lang="en-US" dirty="0"/>
+              <a:t>Due to noise and not very good initial models, the clusters are assigned wrong classes. </a:t>
+            </a:r>
+          </a:p>
+          <a:p>
+            <a:r>
+              <a:rPr lang="en-US" dirty="0"/>
+              <a:t>This assignment of wrong class sticks in the later iterations and leads to other wrong assignments. </a:t>
+            </a:r>
+          </a:p>
+          <a:p>
+            <a:r>
+              <a:rPr lang="en-US" dirty="0"/>
+              <a:t>The reason this is happening is because we are drastically assigning a new class to each cluster based on the initial iterations. Instead of simply assigning a class to each cluster what we can do is assign the probabilities of a cluster belonging to each of the three classes. </a:t>
+            </a:r>
+            <a:endParaRPr lang="en-IN" dirty="0"/>
+          </a:p>
+        </p:txBody>
+      </p:sp>
+    </p:spTree>
+    <p:extLst>
+      <p:ext uri="{BB962C8B-B14F-4D97-AF65-F5344CB8AC3E}">
+        <p14:creationId xmlns:p14="http://schemas.microsoft.com/office/powerpoint/2010/main" val="1493610363"/>
+      </p:ext>
+    </p:extLst>
+  </p:cSld>
+  <p:clrMapOvr>
+    <a:masterClrMapping/>
+  </p:clrMapOvr>
+</p:sld>
+</file>
+
+<file path=ppt/slides/slide11.xml><?xml version="1.0" encoding="utf-8"?>
+<p:sld xmlns:a="http://schemas.openxmlformats.org/drawingml/2006/main" xmlns:r="http://schemas.openxmlformats.org/officeDocument/2006/relationships" xmlns:p="http://schemas.openxmlformats.org/presentationml/2006/main">
+  <p:cSld>
+    <p:spTree>
+      <p:nvGrpSpPr>
+        <p:cNvPr id="1" name=""/>
+        <p:cNvGrpSpPr/>
+        <p:nvPr/>
+      </p:nvGrpSpPr>
+      <p:grpSpPr>
+        <a:xfrm>
+          <a:off x="0" y="0"/>
+          <a:ext cx="0" cy="0"/>
+          <a:chOff x="0" y="0"/>
+          <a:chExt cx="0" cy="0"/>
+        </a:xfrm>
+      </p:grpSpPr>
+      <p:sp>
+        <p:nvSpPr>
+          <p:cNvPr id="2" name="Title 1">
+            <a:extLst>
+              <a:ext uri="{FF2B5EF4-FFF2-40B4-BE49-F238E27FC236}">
+                <a16:creationId xmlns:a16="http://schemas.microsoft.com/office/drawing/2014/main" id="{8B77BF3D-7C68-4C11-AC41-BF1AD83D1532}"/>
+              </a:ext>
+            </a:extLst>
+          </p:cNvPr>
+          <p:cNvSpPr>
+            <a:spLocks noGrp="1"/>
+          </p:cNvSpPr>
+          <p:nvPr>
+            <p:ph type="title"/>
+          </p:nvPr>
+        </p:nvSpPr>
+        <p:spPr/>
+        <p:txBody>
+          <a:bodyPr/>
+          <a:lstStyle/>
+          <a:p>
+            <a:r>
+              <a:rPr lang="en-US" dirty="0"/>
+              <a:t>Probability of cluster belonging to a class</a:t>
+            </a:r>
+            <a:endParaRPr lang="en-IN" dirty="0"/>
+          </a:p>
+        </p:txBody>
+      </p:sp>
+      <mc:AlternateContent xmlns:mc="http://schemas.openxmlformats.org/markup-compatibility/2006" xmlns:a14="http://schemas.microsoft.com/office/drawing/2010/main">
+        <mc:Choice Requires="a14">
+          <p:sp>
+            <p:nvSpPr>
+              <p:cNvPr id="3" name="Content Placeholder 2">
+                <a:extLst>
+                  <a:ext uri="{FF2B5EF4-FFF2-40B4-BE49-F238E27FC236}">
+                    <a16:creationId xmlns:a16="http://schemas.microsoft.com/office/drawing/2014/main" id="{F5453F15-BC1A-46EE-978C-4887FB8F67FB}"/>
+                  </a:ext>
+                </a:extLst>
+              </p:cNvPr>
+              <p:cNvSpPr>
+                <a:spLocks noGrp="1"/>
+              </p:cNvSpPr>
+              <p:nvPr>
+                <p:ph idx="1"/>
+              </p:nvPr>
+            </p:nvSpPr>
+            <p:spPr>
+              <a:xfrm>
+                <a:off x="838200" y="1825625"/>
+                <a:ext cx="10515600" cy="4351338"/>
+              </a:xfrm>
+            </p:spPr>
+            <p:txBody>
+              <a:bodyPr/>
+              <a:lstStyle/>
+              <a:p>
+                <a:r>
+                  <a:rPr lang="en-US" dirty="0"/>
+                  <a:t>Assuming the noise if gaussian, the projection formation model can be described as – </a:t>
+                </a:r>
+              </a:p>
+              <a:p>
+                <a:endParaRPr lang="en-US" dirty="0"/>
+              </a:p>
+              <a:p>
+                <a:endParaRPr lang="en-US" dirty="0"/>
+              </a:p>
+              <a:p>
+                <a:r>
+                  <a:rPr lang="en-US" dirty="0"/>
+                  <a:t>Therefore based on the gaussian distribution, the probability of a projection given that it belongs to class </a:t>
+                </a:r>
+                <a14:m>
+                  <m:oMath xmlns:m="http://schemas.openxmlformats.org/officeDocument/2006/math">
+                    <m:r>
+                      <a:rPr lang="en-US" b="0" i="1" smtClean="0">
+                        <a:latin typeface="Cambria Math" panose="02040503050406030204" pitchFamily="18" charset="0"/>
+                      </a:rPr>
+                      <m:t>𝑖</m:t>
+                    </m:r>
+                  </m:oMath>
+                </a14:m>
+                <a:r>
+                  <a:rPr lang="en-US" dirty="0"/>
+                  <a:t> can be given by </a:t>
+                </a:r>
+                <a14:m>
+                  <m:oMath xmlns:m="http://schemas.openxmlformats.org/officeDocument/2006/math">
+                    <m:sSub>
+                      <m:sSubPr>
+                        <m:ctrlPr>
+                          <a:rPr lang="en-US" b="0" i="1" smtClean="0">
+                            <a:latin typeface="Cambria Math" panose="02040503050406030204" pitchFamily="18" charset="0"/>
+                          </a:rPr>
+                        </m:ctrlPr>
+                      </m:sSubPr>
+                      <m:e>
+                        <m:r>
+                          <a:rPr lang="en-US" b="0" i="1" smtClean="0">
+                            <a:latin typeface="Cambria Math" panose="02040503050406030204" pitchFamily="18" charset="0"/>
+                          </a:rPr>
+                          <m:t>𝑝</m:t>
+                        </m:r>
+                      </m:e>
+                      <m:sub>
+                        <m:r>
+                          <a:rPr lang="en-US" b="0" i="1" smtClean="0">
+                            <a:latin typeface="Cambria Math" panose="02040503050406030204" pitchFamily="18" charset="0"/>
+                          </a:rPr>
+                          <m:t>𝑖</m:t>
+                        </m:r>
+                      </m:sub>
+                    </m:sSub>
+                  </m:oMath>
+                </a14:m>
+                <a:endParaRPr lang="en-US" dirty="0"/>
+              </a:p>
+              <a:p>
+                <a:r>
+                  <a:rPr lang="en-US" dirty="0"/>
+                  <a:t>Since we know that the projection needs to belong to at least one of the three classes, the probability of a projection belonging to a class can be calculated as </a:t>
+                </a:r>
+                <a14:m>
+                  <m:oMath xmlns:m="http://schemas.openxmlformats.org/officeDocument/2006/math">
+                    <m:f>
+                      <m:fPr>
+                        <m:ctrlPr>
+                          <a:rPr lang="en-US" i="1" smtClean="0">
+                            <a:latin typeface="Cambria Math" panose="02040503050406030204" pitchFamily="18" charset="0"/>
+                          </a:rPr>
+                        </m:ctrlPr>
+                      </m:fPr>
+                      <m:num>
+                        <m:sSub>
+                          <m:sSubPr>
+                            <m:ctrlPr>
+                              <a:rPr lang="en-US" b="0" i="1" smtClean="0">
+                                <a:latin typeface="Cambria Math" panose="02040503050406030204" pitchFamily="18" charset="0"/>
+                              </a:rPr>
+                            </m:ctrlPr>
+                          </m:sSubPr>
+                          <m:e>
+                            <m:r>
+                              <a:rPr lang="en-US" b="0" i="1" smtClean="0">
+                                <a:latin typeface="Cambria Math" panose="02040503050406030204" pitchFamily="18" charset="0"/>
+                              </a:rPr>
+                              <m:t>𝑝</m:t>
+                            </m:r>
+                          </m:e>
+                          <m:sub>
+                            <m:r>
+                              <a:rPr lang="en-US" b="0" i="1" smtClean="0">
+                                <a:latin typeface="Cambria Math" panose="02040503050406030204" pitchFamily="18" charset="0"/>
+                              </a:rPr>
+                              <m:t>𝑖</m:t>
+                            </m:r>
+                          </m:sub>
+                        </m:sSub>
+                      </m:num>
+                      <m:den>
+                        <m:sSub>
+                          <m:sSubPr>
+                            <m:ctrlPr>
+                              <a:rPr lang="en-US" b="0" i="1" smtClean="0">
+                                <a:latin typeface="Cambria Math" panose="02040503050406030204" pitchFamily="18" charset="0"/>
+                              </a:rPr>
+                            </m:ctrlPr>
+                          </m:sSubPr>
+                          <m:e>
+                            <m:r>
+                              <a:rPr lang="en-US" b="0" i="1" smtClean="0">
+                                <a:latin typeface="Cambria Math" panose="02040503050406030204" pitchFamily="18" charset="0"/>
+                              </a:rPr>
+                              <m:t>𝑝</m:t>
+                            </m:r>
+                          </m:e>
+                          <m:sub>
+                            <m:r>
+                              <a:rPr lang="en-US" b="0" i="1" smtClean="0">
+                                <a:latin typeface="Cambria Math" panose="02040503050406030204" pitchFamily="18" charset="0"/>
+                              </a:rPr>
+                              <m:t>1</m:t>
+                            </m:r>
+                          </m:sub>
+                        </m:sSub>
+                        <m:r>
+                          <a:rPr lang="en-US" b="0" i="1" smtClean="0">
+                            <a:latin typeface="Cambria Math" panose="02040503050406030204" pitchFamily="18" charset="0"/>
+                          </a:rPr>
+                          <m:t>+</m:t>
+                        </m:r>
+                        <m:sSub>
+                          <m:sSubPr>
+                            <m:ctrlPr>
+                              <a:rPr lang="en-US" b="0" i="1" smtClean="0">
+                                <a:latin typeface="Cambria Math" panose="02040503050406030204" pitchFamily="18" charset="0"/>
+                              </a:rPr>
+                            </m:ctrlPr>
+                          </m:sSubPr>
+                          <m:e>
+                            <m:r>
+                              <a:rPr lang="en-US" b="0" i="1" smtClean="0">
+                                <a:latin typeface="Cambria Math" panose="02040503050406030204" pitchFamily="18" charset="0"/>
+                              </a:rPr>
+                              <m:t>𝑝</m:t>
+                            </m:r>
+                          </m:e>
+                          <m:sub>
+                            <m:r>
+                              <a:rPr lang="en-US" b="0" i="1" smtClean="0">
+                                <a:latin typeface="Cambria Math" panose="02040503050406030204" pitchFamily="18" charset="0"/>
+                              </a:rPr>
+                              <m:t>2</m:t>
+                            </m:r>
+                          </m:sub>
+                        </m:sSub>
+                        <m:r>
+                          <a:rPr lang="en-US" b="0" i="1" smtClean="0">
+                            <a:latin typeface="Cambria Math" panose="02040503050406030204" pitchFamily="18" charset="0"/>
+                          </a:rPr>
+                          <m:t>+</m:t>
+                        </m:r>
+                        <m:sSub>
+                          <m:sSubPr>
+                            <m:ctrlPr>
+                              <a:rPr lang="en-US" b="0" i="1" smtClean="0">
+                                <a:latin typeface="Cambria Math" panose="02040503050406030204" pitchFamily="18" charset="0"/>
+                              </a:rPr>
+                            </m:ctrlPr>
+                          </m:sSubPr>
+                          <m:e>
+                            <m:r>
+                              <a:rPr lang="en-US" b="0" i="1" smtClean="0">
+                                <a:latin typeface="Cambria Math" panose="02040503050406030204" pitchFamily="18" charset="0"/>
+                              </a:rPr>
+                              <m:t>𝑝</m:t>
+                            </m:r>
+                          </m:e>
+                          <m:sub>
+                            <m:r>
+                              <a:rPr lang="en-US" b="0" i="1" smtClean="0">
+                                <a:latin typeface="Cambria Math" panose="02040503050406030204" pitchFamily="18" charset="0"/>
+                              </a:rPr>
+                              <m:t>3</m:t>
+                            </m:r>
+                          </m:sub>
+                        </m:sSub>
+                      </m:den>
+                    </m:f>
+                  </m:oMath>
+                </a14:m>
+                <a:endParaRPr lang="en-US" dirty="0"/>
+              </a:p>
+              <a:p>
+                <a:endParaRPr lang="en-US" dirty="0"/>
+              </a:p>
+              <a:p>
+                <a:pPr marL="0" indent="0">
+                  <a:buNone/>
+                </a:pPr>
+                <a:endParaRPr lang="en-US" dirty="0"/>
+              </a:p>
+            </p:txBody>
+          </p:sp>
+        </mc:Choice>
+        <mc:Fallback xmlns="">
+          <p:sp>
+            <p:nvSpPr>
+              <p:cNvPr id="3" name="Content Placeholder 2">
+                <a:extLst>
+                  <a:ext uri="{FF2B5EF4-FFF2-40B4-BE49-F238E27FC236}">
+                    <a16:creationId xmlns:a16="http://schemas.microsoft.com/office/drawing/2014/main" id="{F5453F15-BC1A-46EE-978C-4887FB8F67FB}"/>
+                  </a:ext>
+                </a:extLst>
+              </p:cNvPr>
+              <p:cNvSpPr>
+                <a:spLocks noGrp="1" noRot="1" noChangeAspect="1" noMove="1" noResize="1" noEditPoints="1" noAdjustHandles="1" noChangeArrowheads="1" noChangeShapeType="1" noTextEdit="1"/>
+              </p:cNvSpPr>
+              <p:nvPr>
+                <p:ph idx="1"/>
+              </p:nvPr>
+            </p:nvSpPr>
+            <p:spPr>
+              <a:xfrm>
+                <a:off x="838200" y="1825625"/>
+                <a:ext cx="10515600" cy="4351338"/>
+              </a:xfrm>
+              <a:blipFill>
+                <a:blip r:embed="rId2"/>
+                <a:stretch>
+                  <a:fillRect l="-1043" t="-2241"/>
+                </a:stretch>
+              </a:blipFill>
+            </p:spPr>
+            <p:txBody>
+              <a:bodyPr/>
+              <a:lstStyle/>
+              <a:p>
+                <a:r>
+                  <a:rPr lang="en-IN">
+                    <a:noFill/>
+                  </a:rPr>
+                  <a:t> </a:t>
+                </a:r>
+              </a:p>
+            </p:txBody>
+          </p:sp>
+        </mc:Fallback>
+      </mc:AlternateContent>
+      <p:pic>
+        <p:nvPicPr>
+          <p:cNvPr id="4" name="Picture 3">
+            <a:extLst>
+              <a:ext uri="{FF2B5EF4-FFF2-40B4-BE49-F238E27FC236}">
+                <a16:creationId xmlns:a16="http://schemas.microsoft.com/office/drawing/2014/main" id="{FF0FBCA6-04D6-4C89-8437-392D6BBDF8B0}"/>
+              </a:ext>
+            </a:extLst>
+          </p:cNvPr>
+          <p:cNvPicPr>
+            <a:picLocks noChangeAspect="1"/>
+          </p:cNvPicPr>
+          <p:nvPr/>
+        </p:nvPicPr>
+        <p:blipFill>
+          <a:blip r:embed="rId3"/>
+          <a:stretch>
+            <a:fillRect/>
+          </a:stretch>
+        </p:blipFill>
+        <p:spPr>
+          <a:xfrm>
+            <a:off x="4464977" y="2651760"/>
+            <a:ext cx="3262045" cy="873760"/>
+          </a:xfrm>
+          <a:prstGeom prst="rect">
+            <a:avLst/>
+          </a:prstGeom>
+        </p:spPr>
+      </p:pic>
+    </p:spTree>
+    <p:extLst>
+      <p:ext uri="{BB962C8B-B14F-4D97-AF65-F5344CB8AC3E}">
+        <p14:creationId xmlns:p14="http://schemas.microsoft.com/office/powerpoint/2010/main" val="382404950"/>
+      </p:ext>
+    </p:extLst>
+  </p:cSld>
+  <p:clrMapOvr>
+    <a:masterClrMapping/>
+  </p:clrMapOvr>
+</p:sld>
+</file>
+
+<file path=ppt/slides/slide12.xml><?xml version="1.0" encoding="utf-8"?>
+<p:sld xmlns:a="http://schemas.openxmlformats.org/drawingml/2006/main" xmlns:r="http://schemas.openxmlformats.org/officeDocument/2006/relationships" xmlns:p="http://schemas.openxmlformats.org/presentationml/2006/main">
+  <p:cSld>
+    <p:spTree>
+      <p:nvGrpSpPr>
+        <p:cNvPr id="1" name=""/>
+        <p:cNvGrpSpPr/>
+        <p:nvPr/>
+      </p:nvGrpSpPr>
+      <p:grpSpPr>
+        <a:xfrm>
+          <a:off x="0" y="0"/>
+          <a:ext cx="0" cy="0"/>
+          <a:chOff x="0" y="0"/>
+          <a:chExt cx="0" cy="0"/>
+        </a:xfrm>
+      </p:grpSpPr>
+      <p:sp>
+        <p:nvSpPr>
+          <p:cNvPr id="2" name="Title 1">
+            <a:extLst>
+              <a:ext uri="{FF2B5EF4-FFF2-40B4-BE49-F238E27FC236}">
+                <a16:creationId xmlns:a16="http://schemas.microsoft.com/office/drawing/2014/main" id="{5373971B-17BB-49A2-BBD3-D5E5BBDA671B}"/>
+              </a:ext>
+            </a:extLst>
+          </p:cNvPr>
+          <p:cNvSpPr>
+            <a:spLocks noGrp="1"/>
+          </p:cNvSpPr>
+          <p:nvPr>
+            <p:ph type="title"/>
+          </p:nvPr>
+        </p:nvSpPr>
+        <p:spPr/>
+        <p:txBody>
+          <a:bodyPr/>
+          <a:lstStyle/>
+          <a:p>
+            <a:r>
+              <a:rPr lang="en-US" dirty="0"/>
+              <a:t>Final Refinement Procedure</a:t>
+            </a:r>
+            <a:endParaRPr lang="en-IN" dirty="0"/>
+          </a:p>
+        </p:txBody>
+      </p:sp>
+      <p:sp>
+        <p:nvSpPr>
+          <p:cNvPr id="3" name="Content Placeholder 2">
+            <a:extLst>
+              <a:ext uri="{FF2B5EF4-FFF2-40B4-BE49-F238E27FC236}">
+                <a16:creationId xmlns:a16="http://schemas.microsoft.com/office/drawing/2014/main" id="{86171C31-94DF-4D94-A2C8-ABBC19F88DDA}"/>
+              </a:ext>
+            </a:extLst>
+          </p:cNvPr>
+          <p:cNvSpPr>
+            <a:spLocks noGrp="1"/>
+          </p:cNvSpPr>
+          <p:nvPr>
+            <p:ph idx="1"/>
+          </p:nvPr>
+        </p:nvSpPr>
+        <p:spPr/>
+        <p:txBody>
+          <a:bodyPr/>
+          <a:lstStyle/>
+          <a:p>
+            <a:r>
+              <a:rPr lang="en-US" dirty="0"/>
+              <a:t>While reconstructing the image, we account for the probability of a projection belonging to that image. </a:t>
+            </a:r>
+          </a:p>
+          <a:p>
+            <a:r>
+              <a:rPr lang="en-US" dirty="0"/>
+              <a:t>This can be done by reconstructing the image using projections multiplied with their respective probabilities. </a:t>
+            </a:r>
+          </a:p>
+          <a:p>
+            <a:r>
+              <a:rPr lang="en-US" dirty="0"/>
+              <a:t>After reconstructing the image, we calculate the new probabilities of each cluster using the refined image. </a:t>
+            </a:r>
+          </a:p>
+          <a:p>
+            <a:r>
+              <a:rPr lang="en-US" dirty="0"/>
+              <a:t>The hope is that even if the probability of a projection belonging to a incorrect class is high at first, over the iterations, it gradually will converge towards the right class. </a:t>
+            </a:r>
+          </a:p>
+        </p:txBody>
+      </p:sp>
+    </p:spTree>
+    <p:extLst>
+      <p:ext uri="{BB962C8B-B14F-4D97-AF65-F5344CB8AC3E}">
+        <p14:creationId xmlns:p14="http://schemas.microsoft.com/office/powerpoint/2010/main" val="3177975569"/>
+      </p:ext>
+    </p:extLst>
+  </p:cSld>
+  <p:clrMapOvr>
+    <a:masterClrMapping/>
+  </p:clrMapOvr>
+</p:sld>
+</file>
+
+<file path=ppt/slides/slide2.xml><?xml version="1.0" encoding="utf-8"?>
+<p:sld xmlns:a="http://schemas.openxmlformats.org/drawingml/2006/main" xmlns:r="http://schemas.openxmlformats.org/officeDocument/2006/relationships" xmlns:p="http://schemas.openxmlformats.org/presentationml/2006/main">
+  <p:cSld>
+    <p:spTree>
+      <p:nvGrpSpPr>
+        <p:cNvPr id="1" name=""/>
+        <p:cNvGrpSpPr/>
+        <p:nvPr/>
+      </p:nvGrpSpPr>
+      <p:grpSpPr>
+        <a:xfrm>
+          <a:off x="0" y="0"/>
+          <a:ext cx="0" cy="0"/>
+          <a:chOff x="0" y="0"/>
+          <a:chExt cx="0" cy="0"/>
+        </a:xfrm>
+      </p:grpSpPr>
+      <p:sp>
+        <p:nvSpPr>
+          <p:cNvPr id="2" name="Title 1">
+            <a:extLst>
+              <a:ext uri="{FF2B5EF4-FFF2-40B4-BE49-F238E27FC236}">
+                <a16:creationId xmlns:a16="http://schemas.microsoft.com/office/drawing/2014/main" id="{1F1A41F1-6761-4927-8199-1B5EB4AE3099}"/>
+              </a:ext>
+            </a:extLst>
+          </p:cNvPr>
+          <p:cNvSpPr>
+            <a:spLocks noGrp="1"/>
+          </p:cNvSpPr>
+          <p:nvPr>
+            <p:ph type="title"/>
+          </p:nvPr>
+        </p:nvSpPr>
+        <p:spPr/>
+        <p:txBody>
+          <a:bodyPr/>
+          <a:lstStyle/>
+          <a:p>
+            <a:r>
+              <a:rPr lang="en-US" dirty="0"/>
+              <a:t>Forming pure clusters and assigning them</a:t>
+            </a:r>
+            <a:endParaRPr lang="en-IN" dirty="0"/>
+          </a:p>
+        </p:txBody>
+      </p:sp>
+      <p:sp>
+        <p:nvSpPr>
+          <p:cNvPr id="3" name="Content Placeholder 2">
+            <a:extLst>
+              <a:ext uri="{FF2B5EF4-FFF2-40B4-BE49-F238E27FC236}">
+                <a16:creationId xmlns:a16="http://schemas.microsoft.com/office/drawing/2014/main" id="{31121FA5-35DC-4D7A-A42A-935EEFB617F3}"/>
+              </a:ext>
+            </a:extLst>
+          </p:cNvPr>
+          <p:cNvSpPr>
+            <a:spLocks noGrp="1"/>
+          </p:cNvSpPr>
+          <p:nvPr>
+            <p:ph idx="1"/>
+          </p:nvPr>
+        </p:nvSpPr>
+        <p:spPr/>
+        <p:txBody>
+          <a:bodyPr/>
+          <a:lstStyle/>
+          <a:p>
+            <a:r>
+              <a:rPr lang="en-US" dirty="0"/>
+              <a:t>The projections are clustered into 300 groups and the L2-norm is used for this. </a:t>
+            </a:r>
+          </a:p>
+          <a:p>
+            <a:r>
+              <a:rPr lang="en-US" dirty="0"/>
+              <a:t>Additionally the a filtering step is also performed for each of the clusters and it is observed that the purity of cluster improves after this step. </a:t>
+            </a:r>
+          </a:p>
+          <a:p>
+            <a:r>
+              <a:rPr lang="en-US" dirty="0"/>
+              <a:t>After forming pure clusters, a denoising step is performed after which the clusters are grouped into three equal parts using their zeroth-moment and are assigned class numbers 1, 2 and 3.</a:t>
+            </a:r>
+          </a:p>
+          <a:p>
+            <a:r>
+              <a:rPr lang="en-US" dirty="0"/>
+              <a:t>An experiment is performed to test the accuracy of these assignments.</a:t>
+            </a:r>
+            <a:endParaRPr lang="en-IN" dirty="0"/>
+          </a:p>
+        </p:txBody>
+      </p:sp>
+    </p:spTree>
+    <p:extLst>
+      <p:ext uri="{BB962C8B-B14F-4D97-AF65-F5344CB8AC3E}">
+        <p14:creationId xmlns:p14="http://schemas.microsoft.com/office/powerpoint/2010/main" val="1717155405"/>
+      </p:ext>
+    </p:extLst>
+  </p:cSld>
+  <p:clrMapOvr>
+    <a:masterClrMapping/>
+  </p:clrMapOvr>
+</p:sld>
+</file>
+
+<file path=ppt/slides/slide3.xml><?xml version="1.0" encoding="utf-8"?>
+<p:sld xmlns:a="http://schemas.openxmlformats.org/drawingml/2006/main" xmlns:r="http://schemas.openxmlformats.org/officeDocument/2006/relationships" xmlns:p="http://schemas.openxmlformats.org/presentationml/2006/main">
+  <p:cSld>
+    <p:spTree>
+      <p:nvGrpSpPr>
+        <p:cNvPr id="1" name=""/>
+        <p:cNvGrpSpPr/>
+        <p:nvPr/>
+      </p:nvGrpSpPr>
+      <p:grpSpPr>
+        <a:xfrm>
+          <a:off x="0" y="0"/>
+          <a:ext cx="0" cy="0"/>
+          <a:chOff x="0" y="0"/>
+          <a:chExt cx="0" cy="0"/>
+        </a:xfrm>
+      </p:grpSpPr>
+      <p:sp>
+        <p:nvSpPr>
+          <p:cNvPr id="5" name="Title 4">
+            <a:extLst>
+              <a:ext uri="{FF2B5EF4-FFF2-40B4-BE49-F238E27FC236}">
+                <a16:creationId xmlns:a16="http://schemas.microsoft.com/office/drawing/2014/main" id="{42D91FF4-5CA2-43A8-91E0-275D3860838C}"/>
+              </a:ext>
+            </a:extLst>
+          </p:cNvPr>
+          <p:cNvSpPr>
+            <a:spLocks noGrp="1"/>
+          </p:cNvSpPr>
+          <p:nvPr>
+            <p:ph type="title"/>
+          </p:nvPr>
+        </p:nvSpPr>
+        <p:spPr/>
+        <p:txBody>
+          <a:bodyPr/>
+          <a:lstStyle/>
+          <a:p>
+            <a:r>
+              <a:rPr lang="en-US" dirty="0"/>
+              <a:t>Clustering based on zeroth-moment</a:t>
+            </a:r>
+            <a:endParaRPr lang="en-IN" dirty="0"/>
+          </a:p>
+        </p:txBody>
+      </p:sp>
+      <mc:AlternateContent xmlns:mc="http://schemas.openxmlformats.org/markup-compatibility/2006" xmlns:a14="http://schemas.microsoft.com/office/drawing/2010/main">
+        <mc:Choice Requires="a14">
           <p:sp>
             <p:nvSpPr>
               <p:cNvPr id="6" name="Content Placeholder 5">
@@ -3463,7 +4742,7 @@
             </p:txBody>
           </p:sp>
         </mc:Choice>
-        <mc:Fallback>
+        <mc:Fallback xmlns="">
           <p:sp>
             <p:nvSpPr>
               <p:cNvPr id="6" name="Content Placeholder 5">
@@ -3516,7 +4795,7 @@
 </p:sld>
 </file>
 
-<file path=ppt/slides/slide2.xml><?xml version="1.0" encoding="utf-8"?>
+<file path=ppt/slides/slide4.xml><?xml version="1.0" encoding="utf-8"?>
 <p:sld xmlns:a="http://schemas.openxmlformats.org/drawingml/2006/main" xmlns:r="http://schemas.openxmlformats.org/officeDocument/2006/relationships" xmlns:p="http://schemas.openxmlformats.org/presentationml/2006/main">
   <p:cSld>
     <p:spTree>
@@ -4720,7 +5999,7 @@
 </p:sld>
 </file>
 
-<file path=ppt/slides/slide3.xml><?xml version="1.0" encoding="utf-8"?>
+<file path=ppt/slides/slide5.xml><?xml version="1.0" encoding="utf-8"?>
 <p:sld xmlns:a="http://schemas.openxmlformats.org/drawingml/2006/main" xmlns:r="http://schemas.openxmlformats.org/officeDocument/2006/relationships" xmlns:p="http://schemas.openxmlformats.org/presentationml/2006/main">
   <p:cSld>
     <p:spTree>
@@ -5342,7 +6621,7 @@
 </p:sld>
 </file>
 
-<file path=ppt/slides/slide4.xml><?xml version="1.0" encoding="utf-8"?>
+<file path=ppt/slides/slide6.xml><?xml version="1.0" encoding="utf-8"?>
 <p:sld xmlns:a="http://schemas.openxmlformats.org/drawingml/2006/main" xmlns:r="http://schemas.openxmlformats.org/officeDocument/2006/relationships" xmlns:p="http://schemas.openxmlformats.org/presentationml/2006/main">
   <p:cSld>
     <p:spTree>
@@ -5388,8 +6667,8 @@
           </a:p>
         </p:txBody>
       </p:sp>
-      <mc:AlternateContent xmlns:mc="http://schemas.openxmlformats.org/markup-compatibility/2006">
-        <mc:Choice xmlns:a14="http://schemas.microsoft.com/office/drawing/2010/main" Requires="a14">
+      <mc:AlternateContent xmlns:mc="http://schemas.openxmlformats.org/markup-compatibility/2006" xmlns:a14="http://schemas.microsoft.com/office/drawing/2010/main">
+        <mc:Choice Requires="a14">
           <p:sp>
             <p:nvSpPr>
               <p:cNvPr id="3" name="Content Placeholder 2">
@@ -5406,10 +6685,15 @@
                 <p:ph idx="1"/>
               </p:nvPr>
             </p:nvSpPr>
-            <p:spPr/>
+            <p:spPr>
+              <a:xfrm>
+                <a:off x="838200" y="1825625"/>
+                <a:ext cx="10515600" cy="4490334"/>
+              </a:xfrm>
+            </p:spPr>
             <p:txBody>
               <a:bodyPr>
-                <a:normAutofit lnSpcReduction="10000"/>
+                <a:normAutofit fontScale="92500" lnSpcReduction="10000"/>
               </a:bodyPr>
               <a:lstStyle/>
               <a:p>
@@ -6719,14 +8003,14 @@
               <a:p>
                 <a:r>
                   <a:rPr lang="en-US" dirty="0"/>
-                  <a:t>Unfortunately this approach failed to correctly refine the class estimate.</a:t>
+                  <a:t>Unfortunately this approach failed to correctly refine the class estimate as the error function is highly-non convex and the solution converges to a wrong one almost every time.</a:t>
                 </a:r>
                 <a:endParaRPr lang="en-IN" dirty="0"/>
               </a:p>
             </p:txBody>
           </p:sp>
         </mc:Choice>
-        <mc:Fallback>
+        <mc:Fallback xmlns="">
           <p:sp>
             <p:nvSpPr>
               <p:cNvPr id="3" name="Content Placeholder 2">
@@ -6744,10 +8028,14 @@
               </p:nvPr>
             </p:nvSpPr>
             <p:spPr>
+              <a:xfrm>
+                <a:off x="838200" y="1825625"/>
+                <a:ext cx="10515600" cy="4490334"/>
+              </a:xfrm>
               <a:blipFill>
                 <a:blip r:embed="rId2"/>
                 <a:stretch>
-                  <a:fillRect l="-1043" t="-3081" b="-3922"/>
+                  <a:fillRect l="-928" t="-2714" r="-1565" b="-1357"/>
                 </a:stretch>
               </a:blipFill>
             </p:spPr>
@@ -6779,7 +8067,7 @@
 </p:sld>
 </file>
 
-<file path=ppt/slides/slide5.xml><?xml version="1.0" encoding="utf-8"?>
+<file path=ppt/slides/slide7.xml><?xml version="1.0" encoding="utf-8"?>
 <p:sld xmlns:a="http://schemas.openxmlformats.org/drawingml/2006/main" xmlns:r="http://schemas.openxmlformats.org/officeDocument/2006/relationships" xmlns:p="http://schemas.openxmlformats.org/presentationml/2006/main">
   <p:cSld>
     <p:spTree>
@@ -6801,7 +8089,7 @@
           <p:cNvPr id="2" name="Title 1">
             <a:extLst>
               <a:ext uri="{FF2B5EF4-FFF2-40B4-BE49-F238E27FC236}">
-                <a16:creationId xmlns:a16="http://schemas.microsoft.com/office/drawing/2014/main" id="{5A5294EA-56A1-47DB-8AC5-08E390C7E5DF}"/>
+                <a16:creationId xmlns:a16="http://schemas.microsoft.com/office/drawing/2014/main" id="{4D2429B0-40FB-4285-B4B8-3660D37C30CA}"/>
               </a:ext>
             </a:extLst>
           </p:cNvPr>
@@ -6819,7 +8107,7 @@
           <a:p>
             <a:r>
               <a:rPr lang="en-US" dirty="0"/>
-              <a:t>Refinement of Clusters-Modified</a:t>
+              <a:t>Alternate approach</a:t>
             </a:r>
             <a:endParaRPr lang="en-IN" dirty="0"/>
           </a:p>
@@ -6830,7 +8118,7 @@
           <p:cNvPr id="3" name="Content Placeholder 2">
             <a:extLst>
               <a:ext uri="{FF2B5EF4-FFF2-40B4-BE49-F238E27FC236}">
-                <a16:creationId xmlns:a16="http://schemas.microsoft.com/office/drawing/2014/main" id="{0668C4A0-FF12-49CB-9BA1-530BFEE738E5}"/>
+                <a16:creationId xmlns:a16="http://schemas.microsoft.com/office/drawing/2014/main" id="{BAB7881F-478E-486C-9B48-41A41D8AA9B3}"/>
               </a:ext>
             </a:extLst>
           </p:cNvPr>
@@ -6848,25 +8136,19 @@
           <a:p>
             <a:r>
               <a:rPr lang="en-US" dirty="0"/>
-              <a:t>The moment-based approach is applied separately for each of the classes and the angles are estimated for each of those classes. </a:t>
+              <a:t>Instead of using the moment-based approach to refine the class estimates we can use the moment-based approach to provide us with the initial estimate for each of the classes. </a:t>
             </a:r>
           </a:p>
           <a:p>
             <a:r>
               <a:rPr lang="en-US" dirty="0"/>
-              <a:t>After estimating the angles of the clusters, we reconstruct the images for the three classes which serve as our initial estimate for the gradient descent approach.</a:t>
+              <a:t>The classes of the cluster can then be refined in the next step – The gradient descent step.</a:t>
             </a:r>
           </a:p>
           <a:p>
             <a:r>
               <a:rPr lang="en-US" dirty="0"/>
-              <a:t>In the gradient descent based approach, we don’t just assign a class to each cluster. Instead we calculate the probability of a cluster belonging to a certain class based on the current angle estimate and current image estimate. </a:t>
-            </a:r>
-          </a:p>
-          <a:p>
-            <a:r>
-              <a:rPr lang="en-US" dirty="0"/>
-              <a:t>The probability is estimated by assuming a gaussian-noise model.</a:t>
+              <a:t>As we are calculating roughly accurate estimates for the orientation projections in the moment-based approach, the hope is that in the refinement step we’ll be able to tell with more accuracy which class a projection belongs to and thus refine the class estimates. </a:t>
             </a:r>
             <a:endParaRPr lang="en-IN" dirty="0"/>
           </a:p>
@@ -6875,7 +8157,7 @@
     </p:spTree>
     <p:extLst>
       <p:ext uri="{BB962C8B-B14F-4D97-AF65-F5344CB8AC3E}">
-        <p14:creationId xmlns:p14="http://schemas.microsoft.com/office/powerpoint/2010/main" val="1870594804"/>
+        <p14:creationId xmlns:p14="http://schemas.microsoft.com/office/powerpoint/2010/main" val="1893414765"/>
       </p:ext>
     </p:extLst>
   </p:cSld>
@@ -6885,7 +8167,7 @@
 </p:sld>
 </file>
 
-<file path=ppt/slides/slide6.xml><?xml version="1.0" encoding="utf-8"?>
+<file path=ppt/slides/slide8.xml><?xml version="1.0" encoding="utf-8"?>
 <p:sld xmlns:a="http://schemas.openxmlformats.org/drawingml/2006/main" xmlns:r="http://schemas.openxmlformats.org/officeDocument/2006/relationships" xmlns:p="http://schemas.openxmlformats.org/presentationml/2006/main">
   <p:cSld>
     <p:spTree>
@@ -6907,7 +8189,7 @@
           <p:cNvPr id="2" name="Title 1">
             <a:extLst>
               <a:ext uri="{FF2B5EF4-FFF2-40B4-BE49-F238E27FC236}">
-                <a16:creationId xmlns:a16="http://schemas.microsoft.com/office/drawing/2014/main" id="{385A6A5D-64C0-4165-B0D0-EC7CADB6EE33}"/>
+                <a16:creationId xmlns:a16="http://schemas.microsoft.com/office/drawing/2014/main" id="{18B8F609-735F-4205-BD77-F418FE61C042}"/>
               </a:ext>
             </a:extLst>
           </p:cNvPr>
@@ -6925,6 +8207,277 @@
           <a:p>
             <a:r>
               <a:rPr lang="en-US" dirty="0"/>
+              <a:t>Moment-Based Estimate</a:t>
+            </a:r>
+            <a:endParaRPr lang="en-IN" dirty="0"/>
+          </a:p>
+        </p:txBody>
+      </p:sp>
+      <p:pic>
+        <p:nvPicPr>
+          <p:cNvPr id="5" name="Content Placeholder 4" descr="A close up of a logo&#10;&#10;Description generated with very high confidence">
+            <a:extLst>
+              <a:ext uri="{FF2B5EF4-FFF2-40B4-BE49-F238E27FC236}">
+                <a16:creationId xmlns:a16="http://schemas.microsoft.com/office/drawing/2014/main" id="{C886505A-ACC9-48D7-8AF1-C424E482D686}"/>
+              </a:ext>
+            </a:extLst>
+          </p:cNvPr>
+          <p:cNvPicPr>
+            <a:picLocks noGrp="1" noChangeAspect="1"/>
+          </p:cNvPicPr>
+          <p:nvPr>
+            <p:ph idx="1"/>
+          </p:nvPr>
+        </p:nvPicPr>
+        <p:blipFill rotWithShape="1">
+          <a:blip r:embed="rId2">
+            <a:extLst>
+              <a:ext uri="{28A0092B-C50C-407E-A947-70E740481C1C}">
+                <a14:useLocalDpi xmlns:a14="http://schemas.microsoft.com/office/drawing/2010/main" val="0"/>
+              </a:ext>
+            </a:extLst>
+          </a:blip>
+          <a:srcRect l="33830" t="15801" r="34166" b="40773"/>
+          <a:stretch/>
+        </p:blipFill>
+        <p:spPr>
+          <a:xfrm>
+            <a:off x="1087118" y="2794655"/>
+            <a:ext cx="1706881" cy="1700828"/>
+          </a:xfrm>
+        </p:spPr>
+      </p:pic>
+      <p:pic>
+        <p:nvPicPr>
+          <p:cNvPr id="7" name="Picture 6" descr="A close up of a mans face&#10;&#10;Description generated with high confidence">
+            <a:extLst>
+              <a:ext uri="{FF2B5EF4-FFF2-40B4-BE49-F238E27FC236}">
+                <a16:creationId xmlns:a16="http://schemas.microsoft.com/office/drawing/2014/main" id="{B2776A9A-88C2-4E5A-971E-917D5DEDD260}"/>
+              </a:ext>
+            </a:extLst>
+          </p:cNvPr>
+          <p:cNvPicPr>
+            <a:picLocks noChangeAspect="1"/>
+          </p:cNvPicPr>
+          <p:nvPr/>
+        </p:nvPicPr>
+        <p:blipFill rotWithShape="1">
+          <a:blip r:embed="rId3">
+            <a:extLst>
+              <a:ext uri="{28A0092B-C50C-407E-A947-70E740481C1C}">
+                <a14:useLocalDpi xmlns:a14="http://schemas.microsoft.com/office/drawing/2010/main" val="0"/>
+              </a:ext>
+            </a:extLst>
+          </a:blip>
+          <a:srcRect l="33664" t="15801" r="34333" b="40773"/>
+          <a:stretch/>
+        </p:blipFill>
+        <p:spPr>
+          <a:xfrm>
+            <a:off x="5242559" y="2799735"/>
+            <a:ext cx="1706881" cy="1700828"/>
+          </a:xfrm>
+          <a:prstGeom prst="rect">
+            <a:avLst/>
+          </a:prstGeom>
+        </p:spPr>
+      </p:pic>
+      <p:pic>
+        <p:nvPicPr>
+          <p:cNvPr id="9" name="Picture 8" descr="A close up of a mans face&#10;&#10;Description generated with high confidence">
+            <a:extLst>
+              <a:ext uri="{FF2B5EF4-FFF2-40B4-BE49-F238E27FC236}">
+                <a16:creationId xmlns:a16="http://schemas.microsoft.com/office/drawing/2014/main" id="{BE0199C9-0F02-4201-8CB1-AD1073115F14}"/>
+              </a:ext>
+            </a:extLst>
+          </p:cNvPr>
+          <p:cNvPicPr>
+            <a:picLocks noChangeAspect="1"/>
+          </p:cNvPicPr>
+          <p:nvPr/>
+        </p:nvPicPr>
+        <p:blipFill rotWithShape="1">
+          <a:blip r:embed="rId4">
+            <a:extLst>
+              <a:ext uri="{28A0092B-C50C-407E-A947-70E740481C1C}">
+                <a14:useLocalDpi xmlns:a14="http://schemas.microsoft.com/office/drawing/2010/main" val="0"/>
+              </a:ext>
+            </a:extLst>
+          </a:blip>
+          <a:srcRect l="34677" t="15801" r="33319" b="40773"/>
+          <a:stretch/>
+        </p:blipFill>
+        <p:spPr>
+          <a:xfrm>
+            <a:off x="9398000" y="2794655"/>
+            <a:ext cx="1706881" cy="1700831"/>
+          </a:xfrm>
+          <a:prstGeom prst="rect">
+            <a:avLst/>
+          </a:prstGeom>
+        </p:spPr>
+      </p:pic>
+      <p:sp>
+        <p:nvSpPr>
+          <p:cNvPr id="10" name="TextBox 9">
+            <a:extLst>
+              <a:ext uri="{FF2B5EF4-FFF2-40B4-BE49-F238E27FC236}">
+                <a16:creationId xmlns:a16="http://schemas.microsoft.com/office/drawing/2014/main" id="{41CFB75E-E06E-46C9-B669-5D5843E0989D}"/>
+              </a:ext>
+            </a:extLst>
+          </p:cNvPr>
+          <p:cNvSpPr txBox="1"/>
+          <p:nvPr/>
+        </p:nvSpPr>
+        <p:spPr>
+          <a:xfrm>
+            <a:off x="1087118" y="4495483"/>
+            <a:ext cx="1706881" cy="369332"/>
+          </a:xfrm>
+          <a:prstGeom prst="rect">
+            <a:avLst/>
+          </a:prstGeom>
+          <a:noFill/>
+        </p:spPr>
+        <p:txBody>
+          <a:bodyPr wrap="square" rtlCol="0">
+            <a:spAutoFit/>
+          </a:bodyPr>
+          <a:lstStyle/>
+          <a:p>
+            <a:r>
+              <a:rPr lang="en-US" dirty="0"/>
+              <a:t>Class 1 Estimate</a:t>
+            </a:r>
+            <a:endParaRPr lang="en-IN" dirty="0"/>
+          </a:p>
+        </p:txBody>
+      </p:sp>
+      <p:sp>
+        <p:nvSpPr>
+          <p:cNvPr id="11" name="TextBox 10">
+            <a:extLst>
+              <a:ext uri="{FF2B5EF4-FFF2-40B4-BE49-F238E27FC236}">
+                <a16:creationId xmlns:a16="http://schemas.microsoft.com/office/drawing/2014/main" id="{F7A4D3BB-D696-4644-80D4-B9C1D32F1B68}"/>
+              </a:ext>
+            </a:extLst>
+          </p:cNvPr>
+          <p:cNvSpPr txBox="1"/>
+          <p:nvPr/>
+        </p:nvSpPr>
+        <p:spPr>
+          <a:xfrm>
+            <a:off x="5242559" y="4509254"/>
+            <a:ext cx="1706881" cy="369332"/>
+          </a:xfrm>
+          <a:prstGeom prst="rect">
+            <a:avLst/>
+          </a:prstGeom>
+          <a:noFill/>
+        </p:spPr>
+        <p:txBody>
+          <a:bodyPr wrap="square" rtlCol="0">
+            <a:spAutoFit/>
+          </a:bodyPr>
+          <a:lstStyle/>
+          <a:p>
+            <a:r>
+              <a:rPr lang="en-US" dirty="0"/>
+              <a:t>Class 2 Estimate</a:t>
+            </a:r>
+            <a:endParaRPr lang="en-IN" dirty="0"/>
+          </a:p>
+        </p:txBody>
+      </p:sp>
+      <p:sp>
+        <p:nvSpPr>
+          <p:cNvPr id="12" name="TextBox 11">
+            <a:extLst>
+              <a:ext uri="{FF2B5EF4-FFF2-40B4-BE49-F238E27FC236}">
+                <a16:creationId xmlns:a16="http://schemas.microsoft.com/office/drawing/2014/main" id="{FE4FB56C-F2EF-4D92-A0A0-96EEC545CB75}"/>
+              </a:ext>
+            </a:extLst>
+          </p:cNvPr>
+          <p:cNvSpPr txBox="1"/>
+          <p:nvPr/>
+        </p:nvSpPr>
+        <p:spPr>
+          <a:xfrm>
+            <a:off x="9398000" y="4514612"/>
+            <a:ext cx="1706881" cy="369332"/>
+          </a:xfrm>
+          <a:prstGeom prst="rect">
+            <a:avLst/>
+          </a:prstGeom>
+          <a:noFill/>
+        </p:spPr>
+        <p:txBody>
+          <a:bodyPr wrap="square" rtlCol="0">
+            <a:spAutoFit/>
+          </a:bodyPr>
+          <a:lstStyle/>
+          <a:p>
+            <a:r>
+              <a:rPr lang="en-US" dirty="0"/>
+              <a:t>Class 3 Estimate</a:t>
+            </a:r>
+            <a:endParaRPr lang="en-IN" dirty="0"/>
+          </a:p>
+        </p:txBody>
+      </p:sp>
+    </p:spTree>
+    <p:extLst>
+      <p:ext uri="{BB962C8B-B14F-4D97-AF65-F5344CB8AC3E}">
+        <p14:creationId xmlns:p14="http://schemas.microsoft.com/office/powerpoint/2010/main" val="1233497862"/>
+      </p:ext>
+    </p:extLst>
+  </p:cSld>
+  <p:clrMapOvr>
+    <a:masterClrMapping/>
+  </p:clrMapOvr>
+</p:sld>
+</file>
+
+<file path=ppt/slides/slide9.xml><?xml version="1.0" encoding="utf-8"?>
+<p:sld xmlns:a="http://schemas.openxmlformats.org/drawingml/2006/main" xmlns:r="http://schemas.openxmlformats.org/officeDocument/2006/relationships" xmlns:p="http://schemas.openxmlformats.org/presentationml/2006/main">
+  <p:cSld>
+    <p:spTree>
+      <p:nvGrpSpPr>
+        <p:cNvPr id="1" name=""/>
+        <p:cNvGrpSpPr/>
+        <p:nvPr/>
+      </p:nvGrpSpPr>
+      <p:grpSpPr>
+        <a:xfrm>
+          <a:off x="0" y="0"/>
+          <a:ext cx="0" cy="0"/>
+          <a:chOff x="0" y="0"/>
+          <a:chExt cx="0" cy="0"/>
+        </a:xfrm>
+      </p:grpSpPr>
+      <p:sp>
+        <p:nvSpPr>
+          <p:cNvPr id="2" name="Title 1">
+            <a:extLst>
+              <a:ext uri="{FF2B5EF4-FFF2-40B4-BE49-F238E27FC236}">
+                <a16:creationId xmlns:a16="http://schemas.microsoft.com/office/drawing/2014/main" id="{5A5294EA-56A1-47DB-8AC5-08E390C7E5DF}"/>
+              </a:ext>
+            </a:extLst>
+          </p:cNvPr>
+          <p:cNvSpPr>
+            <a:spLocks noGrp="1"/>
+          </p:cNvSpPr>
+          <p:nvPr>
+            <p:ph type="title"/>
+          </p:nvPr>
+        </p:nvSpPr>
+        <p:spPr/>
+        <p:txBody>
+          <a:bodyPr/>
+          <a:lstStyle/>
+          <a:p>
+            <a:r>
+              <a:rPr lang="en-US" dirty="0"/>
               <a:t>Refinement of Clusters-Modified</a:t>
             </a:r>
             <a:endParaRPr lang="en-IN" dirty="0"/>
@@ -6936,7 +8489,7 @@
           <p:cNvPr id="3" name="Content Placeholder 2">
             <a:extLst>
               <a:ext uri="{FF2B5EF4-FFF2-40B4-BE49-F238E27FC236}">
-                <a16:creationId xmlns:a16="http://schemas.microsoft.com/office/drawing/2014/main" id="{2595B877-F976-430E-B596-E4FDDBC4E7FC}"/>
+                <a16:creationId xmlns:a16="http://schemas.microsoft.com/office/drawing/2014/main" id="{0668C4A0-FF12-49CB-9BA1-530BFEE738E5}"/>
               </a:ext>
             </a:extLst>
           </p:cNvPr>
@@ -6954,39 +8507,33 @@
           <a:p>
             <a:r>
               <a:rPr lang="en-US" dirty="0"/>
-              <a:t>This probability is incorporated in the reconstruction of the images as well as in the estimation of the angles and shifts. </a:t>
+              <a:t>The moment-based approach is applied separately for each of the classes and the angles are estimated for each of those classes. </a:t>
             </a:r>
           </a:p>
           <a:p>
             <a:r>
               <a:rPr lang="en-US" dirty="0"/>
-              <a:t>At the end of the refinement, we assign the class to the cluster which has the most probability. </a:t>
+              <a:t>After estimating the angles of the clusters, we reconstruct the images for the three classes which serve as our initial estimate for the gradient descent approach.</a:t>
             </a:r>
           </a:p>
           <a:p>
             <a:r>
               <a:rPr lang="en-US" dirty="0"/>
-              <a:t>Unfortunately, even this fails to refine the class estimates and instead gives worst results. </a:t>
+              <a:t>We do a separate gradient descent step for each class to refine.</a:t>
             </a:r>
           </a:p>
           <a:p>
             <a:r>
               <a:rPr lang="en-US" dirty="0"/>
-              <a:t>This is because, if the angles estimates are wrong for one iteration, it will most likely give a different class and then the solution converges to a wrong solution.</a:t>
-            </a:r>
-          </a:p>
-          <a:p>
-            <a:endParaRPr lang="en-US" dirty="0"/>
-          </a:p>
-          <a:p>
-            <a:endParaRPr lang="en-IN" dirty="0"/>
+              <a:t>Then, for each cluster we assign the class which gives the projection along the current theta estimate most similar to the cluster in the L2-norm sense. </a:t>
+            </a:r>
           </a:p>
         </p:txBody>
       </p:sp>
     </p:spTree>
     <p:extLst>
       <p:ext uri="{BB962C8B-B14F-4D97-AF65-F5344CB8AC3E}">
-        <p14:creationId xmlns:p14="http://schemas.microsoft.com/office/powerpoint/2010/main" val="2667553124"/>
+        <p14:creationId xmlns:p14="http://schemas.microsoft.com/office/powerpoint/2010/main" val="1870594804"/>
       </p:ext>
     </p:extLst>
   </p:cSld>

</xml_diff>